<commit_message>
update subject fee set
</commit_message>
<xml_diff>
--- a/exp/instruction/instruction_gr.pptx
+++ b/exp/instruction/instruction_gr.pptx
@@ -4145,7 +4145,15 @@
                   <a:schemeClr val="bg1"/>
                 </a:solidFill>
               </a:rPr>
-              <a:t>	+70</a:t>
+              <a:t>	</a:t>
+            </a:r>
+            <a:r>
+              <a:rPr lang="en-US" altLang="zh-CN" sz="2800" dirty="0" smtClean="0">
+                <a:solidFill>
+                  <a:schemeClr val="bg1"/>
+                </a:solidFill>
+              </a:rPr>
+              <a:t>+60</a:t>
             </a:r>
             <a:r>
               <a:rPr lang="zh-CN" altLang="en-US" sz="2800" dirty="0" smtClean="0">
@@ -6473,23 +6481,7 @@
                   <a:schemeClr val="bg1"/>
                 </a:solidFill>
               </a:rPr>
-              <a:t>色</a:t>
-            </a:r>
-            <a:r>
-              <a:rPr lang="zh-CN" altLang="en-US" dirty="0" smtClean="0">
-                <a:solidFill>
-                  <a:schemeClr val="bg1"/>
-                </a:solidFill>
-              </a:rPr>
-              <a:t>表示得到</a:t>
-            </a:r>
-            <a:r>
-              <a:rPr lang="zh-CN" altLang="en-US" dirty="0" smtClean="0">
-                <a:solidFill>
-                  <a:schemeClr val="bg1"/>
-                </a:solidFill>
-              </a:rPr>
-              <a:t>，</a:t>
+              <a:t>色表示得到，</a:t>
             </a:r>
             <a:r>
               <a:rPr lang="zh-CN" altLang="en-US" dirty="0" smtClean="0">
@@ -6512,15 +6504,7 @@
                   <a:schemeClr val="bg1"/>
                 </a:solidFill>
               </a:rPr>
-              <a:t>色</a:t>
-            </a:r>
-            <a:r>
-              <a:rPr lang="zh-CN" altLang="en-US" dirty="0" smtClean="0">
-                <a:solidFill>
-                  <a:schemeClr val="bg1"/>
-                </a:solidFill>
-              </a:rPr>
-              <a:t>表示失去</a:t>
+              <a:t>色表示失去</a:t>
             </a:r>
             <a:endParaRPr lang="en-US" altLang="zh-CN" dirty="0">
               <a:solidFill>
@@ -9913,7 +9897,15 @@
                   <a:schemeClr val="bg1"/>
                 </a:solidFill>
               </a:rPr>
-              <a:t>抽出一个</a:t>
+              <a:t>抽</a:t>
+            </a:r>
+            <a:r>
+              <a:rPr lang="zh-CN" altLang="en-US" b="1" dirty="0" smtClean="0">
+                <a:solidFill>
+                  <a:schemeClr val="bg1"/>
+                </a:solidFill>
+              </a:rPr>
+              <a:t>出两个</a:t>
             </a:r>
             <a:r>
               <a:rPr lang="zh-CN" altLang="en-US" dirty="0">

</xml_diff>